<commit_message>
Added indel and dbs sigs to the R script.
</commit_message>
<xml_diff>
--- a/paper/figure1.pptx
+++ b/paper/figure1.pptx
@@ -1,6 +1,6 @@
 
 <file path=ppt/presentation.xml><?xml version="1.0" encoding="utf-8"?>
-<p:presentation xmlns:a="http://schemas.openxmlformats.org/drawingml/2006/main" xmlns:r="http://schemas.openxmlformats.org/officeDocument/2006/relationships" xmlns:p="http://schemas.openxmlformats.org/presentationml/2006/main" saveSubsetFonts="1">
+<p:presentation xmlns:a="http://schemas.openxmlformats.org/drawingml/2006/main" xmlns:r="http://schemas.openxmlformats.org/officeDocument/2006/relationships" xmlns:p="http://schemas.openxmlformats.org/presentationml/2006/main" saveSubsetFonts="1" autoCompressPictures="0">
   <p:sldMasterIdLst>
     <p:sldMasterId id="2147483648" r:id="rId1"/>
   </p:sldMasterIdLst>
@@ -104,7 +104,193 @@
       </a:defRPr>
     </a:lvl9pPr>
   </p:defaultTextStyle>
+  <p:extLst>
+    <p:ext uri="{EFAFB233-063F-42B5-8137-9DF3F51BA10A}">
+      <p15:sldGuideLst xmlns:p15="http://schemas.microsoft.com/office/powerpoint/2012/main"/>
+    </p:ext>
+  </p:extLst>
 </p:presentation>
+</file>
+
+<file path=ppt/revisionInfo.xml><?xml version="1.0" encoding="utf-8"?>
+<p1510:revInfo xmlns:a="http://schemas.openxmlformats.org/drawingml/2006/main" xmlns:r="http://schemas.openxmlformats.org/officeDocument/2006/relationships" xmlns:p1510="http://schemas.microsoft.com/office/powerpoint/2015/10/main">
+  <p1510:revLst>
+    <p1510:client id="{0B3DAEC8-672D-4671-A534-6E8754459C6D}" v="8" dt="2021-02-17T14:15:32.782"/>
+  </p1510:revLst>
+</p1510:revInfo>
+</file>
+
+<file path=ppt/changesInfos/changesInfo1.xml><?xml version="1.0" encoding="utf-8"?>
+<pc:chgInfo xmlns:a="http://schemas.openxmlformats.org/drawingml/2006/main" xmlns:r="http://schemas.openxmlformats.org/officeDocument/2006/relationships" xmlns:ac="http://schemas.microsoft.com/office/drawing/2013/main/command" xmlns:pc="http://schemas.microsoft.com/office/powerpoint/2013/main/command">
+  <pc:docChgLst>
+    <pc:chgData name="Pandey,Palash" userId="e501b00f-14cc-4c6b-b0b5-d861cdff7b84" providerId="ADAL" clId="{0B3DAEC8-672D-4671-A534-6E8754459C6D}"/>
+    <pc:docChg chg="custSel modSld">
+      <pc:chgData name="Pandey,Palash" userId="e501b00f-14cc-4c6b-b0b5-d861cdff7b84" providerId="ADAL" clId="{0B3DAEC8-672D-4671-A534-6E8754459C6D}" dt="2021-02-17T14:16:26.155" v="88" actId="1076"/>
+      <pc:docMkLst>
+        <pc:docMk/>
+      </pc:docMkLst>
+      <pc:sldChg chg="addSp delSp modSp mod">
+        <pc:chgData name="Pandey,Palash" userId="e501b00f-14cc-4c6b-b0b5-d861cdff7b84" providerId="ADAL" clId="{0B3DAEC8-672D-4671-A534-6E8754459C6D}" dt="2021-02-17T14:16:26.155" v="88" actId="1076"/>
+        <pc:sldMkLst>
+          <pc:docMk/>
+          <pc:sldMk cId="2063437930" sldId="256"/>
+        </pc:sldMkLst>
+        <pc:spChg chg="mod">
+          <ac:chgData name="Pandey,Palash" userId="e501b00f-14cc-4c6b-b0b5-d861cdff7b84" providerId="ADAL" clId="{0B3DAEC8-672D-4671-A534-6E8754459C6D}" dt="2021-02-17T13:59:53.357" v="67" actId="1076"/>
+          <ac:spMkLst>
+            <pc:docMk/>
+            <pc:sldMk cId="2063437930" sldId="256"/>
+            <ac:spMk id="30" creationId="{E8FDEB09-40D5-4F5B-9414-5B114EEB9A1C}"/>
+          </ac:spMkLst>
+        </pc:spChg>
+        <pc:spChg chg="mod">
+          <ac:chgData name="Pandey,Palash" userId="e501b00f-14cc-4c6b-b0b5-d861cdff7b84" providerId="ADAL" clId="{0B3DAEC8-672D-4671-A534-6E8754459C6D}" dt="2021-02-17T14:11:39.620" v="73" actId="1076"/>
+          <ac:spMkLst>
+            <pc:docMk/>
+            <pc:sldMk cId="2063437930" sldId="256"/>
+            <ac:spMk id="31" creationId="{34689088-126E-49FE-A186-6EC836127E5D}"/>
+          </ac:spMkLst>
+        </pc:spChg>
+        <pc:spChg chg="mod">
+          <ac:chgData name="Pandey,Palash" userId="e501b00f-14cc-4c6b-b0b5-d861cdff7b84" providerId="ADAL" clId="{0B3DAEC8-672D-4671-A534-6E8754459C6D}" dt="2021-02-17T14:16:26.155" v="88" actId="1076"/>
+          <ac:spMkLst>
+            <pc:docMk/>
+            <pc:sldMk cId="2063437930" sldId="256"/>
+            <ac:spMk id="38" creationId="{14A4FDEE-6E29-4AF0-9BF2-4BD055386E2E}"/>
+          </ac:spMkLst>
+        </pc:spChg>
+        <pc:spChg chg="del">
+          <ac:chgData name="Pandey,Palash" userId="e501b00f-14cc-4c6b-b0b5-d861cdff7b84" providerId="ADAL" clId="{0B3DAEC8-672D-4671-A534-6E8754459C6D}" dt="2021-02-17T14:11:31.227" v="71" actId="478"/>
+          <ac:spMkLst>
+            <pc:docMk/>
+            <pc:sldMk cId="2063437930" sldId="256"/>
+            <ac:spMk id="39" creationId="{D57BFEA3-EA14-45F7-AD0B-F416D86F64AB}"/>
+          </ac:spMkLst>
+        </pc:spChg>
+        <pc:picChg chg="add mod">
+          <ac:chgData name="Pandey,Palash" userId="e501b00f-14cc-4c6b-b0b5-d861cdff7b84" providerId="ADAL" clId="{0B3DAEC8-672D-4671-A534-6E8754459C6D}" dt="2021-02-16T12:25:32.436" v="6" actId="1076"/>
+          <ac:picMkLst>
+            <pc:docMk/>
+            <pc:sldMk cId="2063437930" sldId="256"/>
+            <ac:picMk id="3" creationId="{BA2371DD-6D30-43AF-8288-91CCE97A8748}"/>
+          </ac:picMkLst>
+        </pc:picChg>
+        <pc:picChg chg="add del mod">
+          <ac:chgData name="Pandey,Palash" userId="e501b00f-14cc-4c6b-b0b5-d861cdff7b84" providerId="ADAL" clId="{0B3DAEC8-672D-4671-A534-6E8754459C6D}" dt="2021-02-17T13:58:52.678" v="59" actId="478"/>
+          <ac:picMkLst>
+            <pc:docMk/>
+            <pc:sldMk cId="2063437930" sldId="256"/>
+            <ac:picMk id="4" creationId="{9AF39B78-7749-4323-8E5C-47D4B066108A}"/>
+          </ac:picMkLst>
+        </pc:picChg>
+        <pc:picChg chg="add mod">
+          <ac:chgData name="Pandey,Palash" userId="e501b00f-14cc-4c6b-b0b5-d861cdff7b84" providerId="ADAL" clId="{0B3DAEC8-672D-4671-A534-6E8754459C6D}" dt="2021-02-16T12:25:58.226" v="14" actId="1076"/>
+          <ac:picMkLst>
+            <pc:docMk/>
+            <pc:sldMk cId="2063437930" sldId="256"/>
+            <ac:picMk id="5" creationId="{58B1DF07-4990-4D97-AEDC-EEAD974ADD68}"/>
+          </ac:picMkLst>
+        </pc:picChg>
+        <pc:picChg chg="add del mod">
+          <ac:chgData name="Pandey,Palash" userId="e501b00f-14cc-4c6b-b0b5-d861cdff7b84" providerId="ADAL" clId="{0B3DAEC8-672D-4671-A534-6E8754459C6D}" dt="2021-02-17T13:57:31.733" v="49" actId="478"/>
+          <ac:picMkLst>
+            <pc:docMk/>
+            <pc:sldMk cId="2063437930" sldId="256"/>
+            <ac:picMk id="7" creationId="{6223DC88-E213-43B1-8F01-1953F3E848B1}"/>
+          </ac:picMkLst>
+        </pc:picChg>
+        <pc:picChg chg="add mod">
+          <ac:chgData name="Pandey,Palash" userId="e501b00f-14cc-4c6b-b0b5-d861cdff7b84" providerId="ADAL" clId="{0B3DAEC8-672D-4671-A534-6E8754459C6D}" dt="2021-02-17T14:11:55.608" v="77" actId="1076"/>
+          <ac:picMkLst>
+            <pc:docMk/>
+            <pc:sldMk cId="2063437930" sldId="256"/>
+            <ac:picMk id="8" creationId="{DEE6C00D-81CA-4AAA-8DEC-BE6B9BDEC728}"/>
+          </ac:picMkLst>
+        </pc:picChg>
+        <pc:picChg chg="add del mod">
+          <ac:chgData name="Pandey,Palash" userId="e501b00f-14cc-4c6b-b0b5-d861cdff7b84" providerId="ADAL" clId="{0B3DAEC8-672D-4671-A534-6E8754459C6D}" dt="2021-02-17T13:57:32.953" v="50" actId="478"/>
+          <ac:picMkLst>
+            <pc:docMk/>
+            <pc:sldMk cId="2063437930" sldId="256"/>
+            <ac:picMk id="9" creationId="{76737E4A-4DE9-4418-9F96-15AA512305DC}"/>
+          </ac:picMkLst>
+        </pc:picChg>
+        <pc:picChg chg="add mod">
+          <ac:chgData name="Pandey,Palash" userId="e501b00f-14cc-4c6b-b0b5-d861cdff7b84" providerId="ADAL" clId="{0B3DAEC8-672D-4671-A534-6E8754459C6D}" dt="2021-02-16T12:34:30.106" v="42" actId="1076"/>
+          <ac:picMkLst>
+            <pc:docMk/>
+            <pc:sldMk cId="2063437930" sldId="256"/>
+            <ac:picMk id="11" creationId="{1A2C8DD0-C098-4DC5-8AFC-2343AD187E84}"/>
+          </ac:picMkLst>
+        </pc:picChg>
+        <pc:picChg chg="add mod">
+          <ac:chgData name="Pandey,Palash" userId="e501b00f-14cc-4c6b-b0b5-d861cdff7b84" providerId="ADAL" clId="{0B3DAEC8-672D-4671-A534-6E8754459C6D}" dt="2021-02-17T14:16:16.145" v="87" actId="1076"/>
+          <ac:picMkLst>
+            <pc:docMk/>
+            <pc:sldMk cId="2063437930" sldId="256"/>
+            <ac:picMk id="12" creationId="{592F2413-BC24-4913-A07F-FAA5BBAB9904}"/>
+          </ac:picMkLst>
+        </pc:picChg>
+        <pc:picChg chg="mod">
+          <ac:chgData name="Pandey,Palash" userId="e501b00f-14cc-4c6b-b0b5-d861cdff7b84" providerId="ADAL" clId="{0B3DAEC8-672D-4671-A534-6E8754459C6D}" dt="2021-02-17T14:16:08.206" v="86" actId="1076"/>
+          <ac:picMkLst>
+            <pc:docMk/>
+            <pc:sldMk cId="2063437930" sldId="256"/>
+            <ac:picMk id="18" creationId="{A47C8F7D-EF19-4767-9282-4ECD64FA535F}"/>
+          </ac:picMkLst>
+        </pc:picChg>
+        <pc:picChg chg="del">
+          <ac:chgData name="Pandey,Palash" userId="e501b00f-14cc-4c6b-b0b5-d861cdff7b84" providerId="ADAL" clId="{0B3DAEC8-672D-4671-A534-6E8754459C6D}" dt="2021-02-17T14:12:54.725" v="78" actId="478"/>
+          <ac:picMkLst>
+            <pc:docMk/>
+            <pc:sldMk cId="2063437930" sldId="256"/>
+            <ac:picMk id="20" creationId="{89098B69-CBA0-4018-864B-A15AAC3DDAF4}"/>
+          </ac:picMkLst>
+        </pc:picChg>
+        <pc:picChg chg="del mod">
+          <ac:chgData name="Pandey,Palash" userId="e501b00f-14cc-4c6b-b0b5-d861cdff7b84" providerId="ADAL" clId="{0B3DAEC8-672D-4671-A534-6E8754459C6D}" dt="2021-02-16T12:25:44.221" v="10" actId="478"/>
+          <ac:picMkLst>
+            <pc:docMk/>
+            <pc:sldMk cId="2063437930" sldId="256"/>
+            <ac:picMk id="22" creationId="{A1E8F915-3716-4D70-B70B-04EA0990A402}"/>
+          </ac:picMkLst>
+        </pc:picChg>
+        <pc:picChg chg="del">
+          <ac:chgData name="Pandey,Palash" userId="e501b00f-14cc-4c6b-b0b5-d861cdff7b84" providerId="ADAL" clId="{0B3DAEC8-672D-4671-A534-6E8754459C6D}" dt="2021-02-16T12:25:17.256" v="4" actId="478"/>
+          <ac:picMkLst>
+            <pc:docMk/>
+            <pc:sldMk cId="2063437930" sldId="256"/>
+            <ac:picMk id="24" creationId="{0333DEDA-CB2B-4346-B73A-D550A40EEA90}"/>
+          </ac:picMkLst>
+        </pc:picChg>
+        <pc:picChg chg="del">
+          <ac:chgData name="Pandey,Palash" userId="e501b00f-14cc-4c6b-b0b5-d861cdff7b84" providerId="ADAL" clId="{0B3DAEC8-672D-4671-A534-6E8754459C6D}" dt="2021-02-16T12:30:13.746" v="19" actId="478"/>
+          <ac:picMkLst>
+            <pc:docMk/>
+            <pc:sldMk cId="2063437930" sldId="256"/>
+            <ac:picMk id="35" creationId="{C5AD33AB-37C1-41F8-A5A0-C86EA30A4B10}"/>
+          </ac:picMkLst>
+        </pc:picChg>
+        <pc:picChg chg="del">
+          <ac:chgData name="Pandey,Palash" userId="e501b00f-14cc-4c6b-b0b5-d861cdff7b84" providerId="ADAL" clId="{0B3DAEC8-672D-4671-A534-6E8754459C6D}" dt="2021-02-16T12:30:40.586" v="29" actId="478"/>
+          <ac:picMkLst>
+            <pc:docMk/>
+            <pc:sldMk cId="2063437930" sldId="256"/>
+            <ac:picMk id="37" creationId="{B9D2DF22-66D6-4E5A-9AAB-862EBDEAC1E3}"/>
+          </ac:picMkLst>
+        </pc:picChg>
+        <pc:picChg chg="del">
+          <ac:chgData name="Pandey,Palash" userId="e501b00f-14cc-4c6b-b0b5-d861cdff7b84" providerId="ADAL" clId="{0B3DAEC8-672D-4671-A534-6E8754459C6D}" dt="2021-02-16T12:34:16.776" v="37" actId="478"/>
+          <ac:picMkLst>
+            <pc:docMk/>
+            <pc:sldMk cId="2063437930" sldId="256"/>
+            <ac:picMk id="43" creationId="{076C98B9-153D-45CE-9C99-4E3BDFBF4894}"/>
+          </ac:picMkLst>
+        </pc:picChg>
+      </pc:sldChg>
+    </pc:docChg>
+  </pc:docChgLst>
+</pc:chgInfo>
 </file>
 
 <file path=ppt/slideLayouts/slideLayout1.xml><?xml version="1.0" encoding="utf-8"?>
@@ -254,7 +440,7 @@
           <a:p>
             <a:fld id="{460FF90E-6D7D-4763-B4A1-B56060A79806}" type="datetimeFigureOut">
               <a:rPr lang="en-US" smtClean="0"/>
-              <a:t>2/12/2021</a:t>
+              <a:t>2/16/2021</a:t>
             </a:fld>
             <a:endParaRPr lang="en-US"/>
           </a:p>
@@ -452,7 +638,7 @@
           <a:p>
             <a:fld id="{460FF90E-6D7D-4763-B4A1-B56060A79806}" type="datetimeFigureOut">
               <a:rPr lang="en-US" smtClean="0"/>
-              <a:t>2/12/2021</a:t>
+              <a:t>2/16/2021</a:t>
             </a:fld>
             <a:endParaRPr lang="en-US"/>
           </a:p>
@@ -660,7 +846,7 @@
           <a:p>
             <a:fld id="{460FF90E-6D7D-4763-B4A1-B56060A79806}" type="datetimeFigureOut">
               <a:rPr lang="en-US" smtClean="0"/>
-              <a:t>2/12/2021</a:t>
+              <a:t>2/16/2021</a:t>
             </a:fld>
             <a:endParaRPr lang="en-US"/>
           </a:p>
@@ -858,7 +1044,7 @@
           <a:p>
             <a:fld id="{460FF90E-6D7D-4763-B4A1-B56060A79806}" type="datetimeFigureOut">
               <a:rPr lang="en-US" smtClean="0"/>
-              <a:t>2/12/2021</a:t>
+              <a:t>2/16/2021</a:t>
             </a:fld>
             <a:endParaRPr lang="en-US"/>
           </a:p>
@@ -1133,7 +1319,7 @@
           <a:p>
             <a:fld id="{460FF90E-6D7D-4763-B4A1-B56060A79806}" type="datetimeFigureOut">
               <a:rPr lang="en-US" smtClean="0"/>
-              <a:t>2/12/2021</a:t>
+              <a:t>2/16/2021</a:t>
             </a:fld>
             <a:endParaRPr lang="en-US"/>
           </a:p>
@@ -1398,7 +1584,7 @@
           <a:p>
             <a:fld id="{460FF90E-6D7D-4763-B4A1-B56060A79806}" type="datetimeFigureOut">
               <a:rPr lang="en-US" smtClean="0"/>
-              <a:t>2/12/2021</a:t>
+              <a:t>2/16/2021</a:t>
             </a:fld>
             <a:endParaRPr lang="en-US"/>
           </a:p>
@@ -1810,7 +1996,7 @@
           <a:p>
             <a:fld id="{460FF90E-6D7D-4763-B4A1-B56060A79806}" type="datetimeFigureOut">
               <a:rPr lang="en-US" smtClean="0"/>
-              <a:t>2/12/2021</a:t>
+              <a:t>2/16/2021</a:t>
             </a:fld>
             <a:endParaRPr lang="en-US"/>
           </a:p>
@@ -1951,7 +2137,7 @@
           <a:p>
             <a:fld id="{460FF90E-6D7D-4763-B4A1-B56060A79806}" type="datetimeFigureOut">
               <a:rPr lang="en-US" smtClean="0"/>
-              <a:t>2/12/2021</a:t>
+              <a:t>2/16/2021</a:t>
             </a:fld>
             <a:endParaRPr lang="en-US"/>
           </a:p>
@@ -2064,7 +2250,7 @@
           <a:p>
             <a:fld id="{460FF90E-6D7D-4763-B4A1-B56060A79806}" type="datetimeFigureOut">
               <a:rPr lang="en-US" smtClean="0"/>
-              <a:t>2/12/2021</a:t>
+              <a:t>2/16/2021</a:t>
             </a:fld>
             <a:endParaRPr lang="en-US"/>
           </a:p>
@@ -2375,7 +2561,7 @@
           <a:p>
             <a:fld id="{460FF90E-6D7D-4763-B4A1-B56060A79806}" type="datetimeFigureOut">
               <a:rPr lang="en-US" smtClean="0"/>
-              <a:t>2/12/2021</a:t>
+              <a:t>2/16/2021</a:t>
             </a:fld>
             <a:endParaRPr lang="en-US"/>
           </a:p>
@@ -2663,7 +2849,7 @@
           <a:p>
             <a:fld id="{460FF90E-6D7D-4763-B4A1-B56060A79806}" type="datetimeFigureOut">
               <a:rPr lang="en-US" smtClean="0"/>
-              <a:t>2/12/2021</a:t>
+              <a:t>2/16/2021</a:t>
             </a:fld>
             <a:endParaRPr lang="en-US"/>
           </a:p>
@@ -2904,7 +3090,7 @@
           <a:p>
             <a:fld id="{460FF90E-6D7D-4763-B4A1-B56060A79806}" type="datetimeFigureOut">
               <a:rPr lang="en-US" smtClean="0"/>
-              <a:t>2/12/2021</a:t>
+              <a:t>2/16/2021</a:t>
             </a:fld>
             <a:endParaRPr lang="en-US"/>
           </a:p>
@@ -3349,116 +3535,8 @@
         </p:blipFill>
         <p:spPr>
           <a:xfrm>
-            <a:off x="119709" y="4668855"/>
+            <a:off x="90975" y="4781483"/>
             <a:ext cx="5813731" cy="1866727"/>
-          </a:xfrm>
-          <a:prstGeom prst="rect">
-            <a:avLst/>
-          </a:prstGeom>
-        </p:spPr>
-      </p:pic>
-      <p:pic>
-        <p:nvPicPr>
-          <p:cNvPr id="20" name="Picture 19" descr="Chart, waterfall chart&#10;&#10;Description automatically generated">
-            <a:extLst>
-              <a:ext uri="{FF2B5EF4-FFF2-40B4-BE49-F238E27FC236}">
-                <a16:creationId xmlns:a16="http://schemas.microsoft.com/office/drawing/2014/main" id="{89098B69-CBA0-4018-864B-A15AAC3DDAF4}"/>
-              </a:ext>
-            </a:extLst>
-          </p:cNvPr>
-          <p:cNvPicPr>
-            <a:picLocks noChangeAspect="1"/>
-          </p:cNvPicPr>
-          <p:nvPr/>
-        </p:nvPicPr>
-        <p:blipFill>
-          <a:blip r:embed="rId3">
-            <a:extLst>
-              <a:ext uri="{28A0092B-C50C-407E-A947-70E740481C1C}">
-                <a14:useLocalDpi xmlns:a14="http://schemas.microsoft.com/office/drawing/2010/main" val="0"/>
-              </a:ext>
-            </a:extLst>
-          </a:blip>
-          <a:stretch>
-            <a:fillRect/>
-          </a:stretch>
-        </p:blipFill>
-        <p:spPr>
-          <a:xfrm>
-            <a:off x="5956300" y="4596817"/>
-            <a:ext cx="6235700" cy="1938765"/>
-          </a:xfrm>
-          <a:prstGeom prst="rect">
-            <a:avLst/>
-          </a:prstGeom>
-        </p:spPr>
-      </p:pic>
-      <p:pic>
-        <p:nvPicPr>
-          <p:cNvPr id="22" name="Picture 21" descr="A picture containing chart&#10;&#10;Description automatically generated">
-            <a:extLst>
-              <a:ext uri="{FF2B5EF4-FFF2-40B4-BE49-F238E27FC236}">
-                <a16:creationId xmlns:a16="http://schemas.microsoft.com/office/drawing/2014/main" id="{A1E8F915-3716-4D70-B70B-04EA0990A402}"/>
-              </a:ext>
-            </a:extLst>
-          </p:cNvPr>
-          <p:cNvPicPr>
-            <a:picLocks noChangeAspect="1"/>
-          </p:cNvPicPr>
-          <p:nvPr/>
-        </p:nvPicPr>
-        <p:blipFill>
-          <a:blip r:embed="rId4">
-            <a:extLst>
-              <a:ext uri="{28A0092B-C50C-407E-A947-70E740481C1C}">
-                <a14:useLocalDpi xmlns:a14="http://schemas.microsoft.com/office/drawing/2010/main" val="0"/>
-              </a:ext>
-            </a:extLst>
-          </a:blip>
-          <a:stretch>
-            <a:fillRect/>
-          </a:stretch>
-        </p:blipFill>
-        <p:spPr>
-          <a:xfrm>
-            <a:off x="9471897" y="105259"/>
-            <a:ext cx="2432884" cy="2418067"/>
-          </a:xfrm>
-          <a:prstGeom prst="rect">
-            <a:avLst/>
-          </a:prstGeom>
-        </p:spPr>
-      </p:pic>
-      <p:pic>
-        <p:nvPicPr>
-          <p:cNvPr id="24" name="Picture 23" descr="Chart&#10;&#10;Description automatically generated with medium confidence">
-            <a:extLst>
-              <a:ext uri="{FF2B5EF4-FFF2-40B4-BE49-F238E27FC236}">
-                <a16:creationId xmlns:a16="http://schemas.microsoft.com/office/drawing/2014/main" id="{0333DEDA-CB2B-4346-B73A-D550A40EEA90}"/>
-              </a:ext>
-            </a:extLst>
-          </p:cNvPr>
-          <p:cNvPicPr>
-            <a:picLocks noChangeAspect="1"/>
-          </p:cNvPicPr>
-          <p:nvPr/>
-        </p:nvPicPr>
-        <p:blipFill>
-          <a:blip r:embed="rId5">
-            <a:extLst>
-              <a:ext uri="{28A0092B-C50C-407E-A947-70E740481C1C}">
-                <a14:useLocalDpi xmlns:a14="http://schemas.microsoft.com/office/drawing/2010/main" val="0"/>
-              </a:ext>
-            </a:extLst>
-          </a:blip>
-          <a:stretch>
-            <a:fillRect/>
-          </a:stretch>
-        </p:blipFill>
-        <p:spPr>
-          <a:xfrm>
-            <a:off x="7030412" y="166327"/>
-            <a:ext cx="2308405" cy="2335634"/>
           </a:xfrm>
           <a:prstGeom prst="rect">
             <a:avLst/>
@@ -3514,7 +3592,7 @@
         </p:nvSpPr>
         <p:spPr>
           <a:xfrm>
-            <a:off x="264896" y="2501961"/>
+            <a:off x="176710" y="2310970"/>
             <a:ext cx="327334" cy="369332"/>
           </a:xfrm>
           <a:prstGeom prst="rect">
@@ -3549,7 +3627,7 @@
         </p:nvSpPr>
         <p:spPr>
           <a:xfrm>
-            <a:off x="6382537" y="2501961"/>
+            <a:off x="207168" y="4412151"/>
             <a:ext cx="296876" cy="369332"/>
           </a:xfrm>
           <a:prstGeom prst="rect">
@@ -3641,12 +3719,47 @@
           </a:p>
         </p:txBody>
       </p:sp>
+      <p:sp>
+        <p:nvSpPr>
+          <p:cNvPr id="38" name="TextBox 37">
+            <a:extLst>
+              <a:ext uri="{FF2B5EF4-FFF2-40B4-BE49-F238E27FC236}">
+                <a16:creationId xmlns:a16="http://schemas.microsoft.com/office/drawing/2014/main" id="{14A4FDEE-6E29-4AF0-9BF2-4BD055386E2E}"/>
+              </a:ext>
+            </a:extLst>
+          </p:cNvPr>
+          <p:cNvSpPr txBox="1"/>
+          <p:nvPr/>
+        </p:nvSpPr>
+        <p:spPr>
+          <a:xfrm>
+            <a:off x="11305368" y="4440257"/>
+            <a:ext cx="290464" cy="369332"/>
+          </a:xfrm>
+          <a:prstGeom prst="rect">
+            <a:avLst/>
+          </a:prstGeom>
+          <a:noFill/>
+        </p:spPr>
+        <p:txBody>
+          <a:bodyPr wrap="none" rtlCol="0">
+            <a:spAutoFit/>
+          </a:bodyPr>
+          <a:lstStyle/>
+          <a:p>
+            <a:r>
+              <a:rPr lang="en-US" dirty="0"/>
+              <a:t>F</a:t>
+            </a:r>
+          </a:p>
+        </p:txBody>
+      </p:sp>
       <p:pic>
         <p:nvPicPr>
-          <p:cNvPr id="35" name="Picture 34" descr="Chart, bar chart&#10;&#10;Description automatically generated">
-            <a:extLst>
-              <a:ext uri="{FF2B5EF4-FFF2-40B4-BE49-F238E27FC236}">
-                <a16:creationId xmlns:a16="http://schemas.microsoft.com/office/drawing/2014/main" id="{C5AD33AB-37C1-41F8-A5A0-C86EA30A4B10}"/>
+          <p:cNvPr id="3" name="Picture 2" descr="Chart&#10;&#10;Description automatically generated">
+            <a:extLst>
+              <a:ext uri="{FF2B5EF4-FFF2-40B4-BE49-F238E27FC236}">
+                <a16:creationId xmlns:a16="http://schemas.microsoft.com/office/drawing/2014/main" id="{BA2371DD-6D30-43AF-8288-91CCE97A8748}"/>
               </a:ext>
             </a:extLst>
           </p:cNvPr>
@@ -3656,7 +3769,7 @@
           <p:nvPr/>
         </p:nvPicPr>
         <p:blipFill>
-          <a:blip r:embed="rId6">
+          <a:blip r:embed="rId3">
             <a:extLst>
               <a:ext uri="{28A0092B-C50C-407E-A947-70E740481C1C}">
                 <a14:useLocalDpi xmlns:a14="http://schemas.microsoft.com/office/drawing/2010/main" val="0"/>
@@ -3669,8 +3782,8 @@
         </p:blipFill>
         <p:spPr>
           <a:xfrm>
-            <a:off x="561643" y="2347881"/>
-            <a:ext cx="3490350" cy="2243796"/>
+            <a:off x="7132613" y="105259"/>
+            <a:ext cx="2069103" cy="2090297"/>
           </a:xfrm>
           <a:prstGeom prst="rect">
             <a:avLst/>
@@ -3679,10 +3792,10 @@
       </p:pic>
       <p:pic>
         <p:nvPicPr>
-          <p:cNvPr id="37" name="Picture 36" descr="Chart, bar chart, histogram&#10;&#10;Description automatically generated">
-            <a:extLst>
-              <a:ext uri="{FF2B5EF4-FFF2-40B4-BE49-F238E27FC236}">
-                <a16:creationId xmlns:a16="http://schemas.microsoft.com/office/drawing/2014/main" id="{B9D2DF22-66D6-4E5A-9AAB-862EBDEAC1E3}"/>
+          <p:cNvPr id="5" name="Picture 4" descr="A picture containing chart&#10;&#10;Description automatically generated">
+            <a:extLst>
+              <a:ext uri="{FF2B5EF4-FFF2-40B4-BE49-F238E27FC236}">
+                <a16:creationId xmlns:a16="http://schemas.microsoft.com/office/drawing/2014/main" id="{58B1DF07-4990-4D97-AEDC-EEAD974ADD68}"/>
               </a:ext>
             </a:extLst>
           </p:cNvPr>
@@ -3692,7 +3805,7 @@
           <p:nvPr/>
         </p:nvPicPr>
         <p:blipFill>
-          <a:blip r:embed="rId7">
+          <a:blip r:embed="rId4">
             <a:extLst>
               <a:ext uri="{28A0092B-C50C-407E-A947-70E740481C1C}">
                 <a14:useLocalDpi xmlns:a14="http://schemas.microsoft.com/office/drawing/2010/main" val="0"/>
@@ -3705,90 +3818,20 @@
         </p:blipFill>
         <p:spPr>
           <a:xfrm>
-            <a:off x="7030412" y="2514516"/>
-            <a:ext cx="3781187" cy="2077103"/>
+            <a:off x="9725203" y="105259"/>
+            <a:ext cx="2172792" cy="2118404"/>
           </a:xfrm>
           <a:prstGeom prst="rect">
             <a:avLst/>
           </a:prstGeom>
         </p:spPr>
       </p:pic>
-      <p:sp>
-        <p:nvSpPr>
-          <p:cNvPr id="38" name="TextBox 37">
-            <a:extLst>
-              <a:ext uri="{FF2B5EF4-FFF2-40B4-BE49-F238E27FC236}">
-                <a16:creationId xmlns:a16="http://schemas.microsoft.com/office/drawing/2014/main" id="{14A4FDEE-6E29-4AF0-9BF2-4BD055386E2E}"/>
-              </a:ext>
-            </a:extLst>
-          </p:cNvPr>
-          <p:cNvSpPr txBox="1"/>
-          <p:nvPr/>
-        </p:nvSpPr>
-        <p:spPr>
-          <a:xfrm>
-            <a:off x="234309" y="4260934"/>
-            <a:ext cx="290464" cy="369332"/>
-          </a:xfrm>
-          <a:prstGeom prst="rect">
-            <a:avLst/>
-          </a:prstGeom>
-          <a:noFill/>
-        </p:spPr>
-        <p:txBody>
-          <a:bodyPr wrap="none" rtlCol="0">
-            <a:spAutoFit/>
-          </a:bodyPr>
-          <a:lstStyle/>
-          <a:p>
-            <a:r>
-              <a:rPr lang="en-US" dirty="0"/>
-              <a:t>F</a:t>
-            </a:r>
-          </a:p>
-        </p:txBody>
-      </p:sp>
-      <p:sp>
-        <p:nvSpPr>
-          <p:cNvPr id="39" name="TextBox 38">
-            <a:extLst>
-              <a:ext uri="{FF2B5EF4-FFF2-40B4-BE49-F238E27FC236}">
-                <a16:creationId xmlns:a16="http://schemas.microsoft.com/office/drawing/2014/main" id="{D57BFEA3-EA14-45F7-AD0B-F416D86F64AB}"/>
-              </a:ext>
-            </a:extLst>
-          </p:cNvPr>
-          <p:cNvSpPr txBox="1"/>
-          <p:nvPr/>
-        </p:nvSpPr>
-        <p:spPr>
-          <a:xfrm>
-            <a:off x="6363912" y="4280056"/>
-            <a:ext cx="330540" cy="369332"/>
-          </a:xfrm>
-          <a:prstGeom prst="rect">
-            <a:avLst/>
-          </a:prstGeom>
-          <a:noFill/>
-        </p:spPr>
-        <p:txBody>
-          <a:bodyPr wrap="none" rtlCol="0">
-            <a:spAutoFit/>
-          </a:bodyPr>
-          <a:lstStyle/>
-          <a:p>
-            <a:r>
-              <a:rPr lang="en-US" dirty="0"/>
-              <a:t>G</a:t>
-            </a:r>
-          </a:p>
-        </p:txBody>
-      </p:sp>
       <p:pic>
         <p:nvPicPr>
-          <p:cNvPr id="43" name="Picture 42" descr="Graphical user interface, application&#10;&#10;Description automatically generated">
-            <a:extLst>
-              <a:ext uri="{FF2B5EF4-FFF2-40B4-BE49-F238E27FC236}">
-                <a16:creationId xmlns:a16="http://schemas.microsoft.com/office/drawing/2014/main" id="{076C98B9-153D-45CE-9C99-4E3BDFBF4894}"/>
+          <p:cNvPr id="11" name="Picture 10" descr="Diagram&#10;&#10;Description automatically generated">
+            <a:extLst>
+              <a:ext uri="{FF2B5EF4-FFF2-40B4-BE49-F238E27FC236}">
+                <a16:creationId xmlns:a16="http://schemas.microsoft.com/office/drawing/2014/main" id="{1A2C8DD0-C098-4DC5-8AFC-2343AD187E84}"/>
               </a:ext>
             </a:extLst>
           </p:cNvPr>
@@ -3798,7 +3841,7 @@
           <p:nvPr/>
         </p:nvPicPr>
         <p:blipFill>
-          <a:blip r:embed="rId8">
+          <a:blip r:embed="rId5">
             <a:extLst>
               <a:ext uri="{28A0092B-C50C-407E-A947-70E740481C1C}">
                 <a14:useLocalDpi xmlns:a14="http://schemas.microsoft.com/office/drawing/2010/main" val="0"/>
@@ -3811,8 +3854,74 @@
         </p:blipFill>
         <p:spPr>
           <a:xfrm>
-            <a:off x="120994" y="292952"/>
-            <a:ext cx="6741438" cy="2209009"/>
+            <a:off x="504044" y="105259"/>
+            <a:ext cx="6189361" cy="2028107"/>
+          </a:xfrm>
+          <a:prstGeom prst="rect">
+            <a:avLst/>
+          </a:prstGeom>
+        </p:spPr>
+      </p:pic>
+      <p:pic>
+        <p:nvPicPr>
+          <p:cNvPr id="8" name="Graphic 7">
+            <a:extLst>
+              <a:ext uri="{FF2B5EF4-FFF2-40B4-BE49-F238E27FC236}">
+                <a16:creationId xmlns:a16="http://schemas.microsoft.com/office/drawing/2014/main" id="{DEE6C00D-81CA-4AAA-8DEC-BE6B9BDEC728}"/>
+              </a:ext>
+            </a:extLst>
+          </p:cNvPr>
+          <p:cNvPicPr>
+            <a:picLocks noChangeAspect="1"/>
+          </p:cNvPicPr>
+          <p:nvPr/>
+        </p:nvPicPr>
+        <p:blipFill>
+          <a:blip r:embed="rId6">
+            <a:extLst>
+              <a:ext uri="{96DAC541-7B7A-43D3-8B79-37D633B846F1}">
+                <asvg:svgBlip xmlns:asvg="http://schemas.microsoft.com/office/drawing/2016/SVG/main" r:embed="rId7"/>
+              </a:ext>
+            </a:extLst>
+          </a:blip>
+          <a:stretch>
+            <a:fillRect/>
+          </a:stretch>
+        </p:blipFill>
+        <p:spPr>
+          <a:xfrm>
+            <a:off x="437425" y="2303889"/>
+            <a:ext cx="6442827" cy="2328671"/>
+          </a:xfrm>
+          <a:prstGeom prst="rect">
+            <a:avLst/>
+          </a:prstGeom>
+        </p:spPr>
+      </p:pic>
+      <p:pic>
+        <p:nvPicPr>
+          <p:cNvPr id="12" name="Picture 11" descr="Chart&#10;&#10;Description automatically generated">
+            <a:extLst>
+              <a:ext uri="{FF2B5EF4-FFF2-40B4-BE49-F238E27FC236}">
+                <a16:creationId xmlns:a16="http://schemas.microsoft.com/office/drawing/2014/main" id="{592F2413-BC24-4913-A07F-FAA5BBAB9904}"/>
+              </a:ext>
+            </a:extLst>
+          </p:cNvPr>
+          <p:cNvPicPr>
+            <a:picLocks noChangeAspect="1"/>
+          </p:cNvPicPr>
+          <p:nvPr/>
+        </p:nvPicPr>
+        <p:blipFill>
+          <a:blip r:embed="rId8"/>
+          <a:stretch>
+            <a:fillRect/>
+          </a:stretch>
+        </p:blipFill>
+        <p:spPr>
+          <a:xfrm>
+            <a:off x="5904706" y="4781482"/>
+            <a:ext cx="6287294" cy="1866727"/>
           </a:xfrm>
           <a:prstGeom prst="rect">
             <a:avLst/>

</xml_diff>

<commit_message>
modularized code, updated dockerfile
</commit_message>
<xml_diff>
--- a/paper/figure1.pptx
+++ b/paper/figure1.pptx
@@ -115,7 +115,7 @@
 <file path=ppt/revisionInfo.xml><?xml version="1.0" encoding="utf-8"?>
 <p1510:revInfo xmlns:a="http://schemas.openxmlformats.org/drawingml/2006/main" xmlns:r="http://schemas.openxmlformats.org/officeDocument/2006/relationships" xmlns:p1510="http://schemas.microsoft.com/office/powerpoint/2015/10/main">
   <p1510:revLst>
-    <p1510:client id="{0B3DAEC8-672D-4671-A534-6E8754459C6D}" v="8" dt="2021-02-17T14:15:32.782"/>
+    <p1510:client id="{0B3DAEC8-672D-4671-A534-6E8754459C6D}" v="9" dt="2021-02-22T14:15:12.860"/>
   </p1510:revLst>
 </p1510:revInfo>
 </file>
@@ -125,12 +125,12 @@
   <pc:docChgLst>
     <pc:chgData name="Pandey,Palash" userId="e501b00f-14cc-4c6b-b0b5-d861cdff7b84" providerId="ADAL" clId="{0B3DAEC8-672D-4671-A534-6E8754459C6D}"/>
     <pc:docChg chg="custSel modSld">
-      <pc:chgData name="Pandey,Palash" userId="e501b00f-14cc-4c6b-b0b5-d861cdff7b84" providerId="ADAL" clId="{0B3DAEC8-672D-4671-A534-6E8754459C6D}" dt="2021-02-17T14:16:26.155" v="88" actId="1076"/>
+      <pc:chgData name="Pandey,Palash" userId="e501b00f-14cc-4c6b-b0b5-d861cdff7b84" providerId="ADAL" clId="{0B3DAEC8-672D-4671-A534-6E8754459C6D}" dt="2021-02-22T14:25:54.264" v="101" actId="1076"/>
       <pc:docMkLst>
         <pc:docMk/>
       </pc:docMkLst>
       <pc:sldChg chg="addSp delSp modSp mod">
-        <pc:chgData name="Pandey,Palash" userId="e501b00f-14cc-4c6b-b0b5-d861cdff7b84" providerId="ADAL" clId="{0B3DAEC8-672D-4671-A534-6E8754459C6D}" dt="2021-02-17T14:16:26.155" v="88" actId="1076"/>
+        <pc:chgData name="Pandey,Palash" userId="e501b00f-14cc-4c6b-b0b5-d861cdff7b84" providerId="ADAL" clId="{0B3DAEC8-672D-4671-A534-6E8754459C6D}" dt="2021-02-22T14:25:54.264" v="101" actId="1076"/>
         <pc:sldMkLst>
           <pc:docMk/>
           <pc:sldMk cId="2063437930" sldId="256"/>
@@ -184,6 +184,14 @@
           </ac:picMkLst>
         </pc:picChg>
         <pc:picChg chg="add mod">
+          <ac:chgData name="Pandey,Palash" userId="e501b00f-14cc-4c6b-b0b5-d861cdff7b84" providerId="ADAL" clId="{0B3DAEC8-672D-4671-A534-6E8754459C6D}" dt="2021-02-22T14:25:54.264" v="101" actId="1076"/>
+          <ac:picMkLst>
+            <pc:docMk/>
+            <pc:sldMk cId="2063437930" sldId="256"/>
+            <ac:picMk id="4" creationId="{FD5CE793-5162-4A53-A1F1-162AFFA24F6E}"/>
+          </ac:picMkLst>
+        </pc:picChg>
+        <pc:picChg chg="add mod">
           <ac:chgData name="Pandey,Palash" userId="e501b00f-14cc-4c6b-b0b5-d861cdff7b84" providerId="ADAL" clId="{0B3DAEC8-672D-4671-A534-6E8754459C6D}" dt="2021-02-16T12:25:58.226" v="14" actId="1076"/>
           <ac:picMkLst>
             <pc:docMk/>
@@ -199,8 +207,8 @@
             <ac:picMk id="7" creationId="{6223DC88-E213-43B1-8F01-1953F3E848B1}"/>
           </ac:picMkLst>
         </pc:picChg>
-        <pc:picChg chg="add mod">
-          <ac:chgData name="Pandey,Palash" userId="e501b00f-14cc-4c6b-b0b5-d861cdff7b84" providerId="ADAL" clId="{0B3DAEC8-672D-4671-A534-6E8754459C6D}" dt="2021-02-17T14:11:55.608" v="77" actId="1076"/>
+        <pc:picChg chg="add del mod">
+          <ac:chgData name="Pandey,Palash" userId="e501b00f-14cc-4c6b-b0b5-d861cdff7b84" providerId="ADAL" clId="{0B3DAEC8-672D-4671-A534-6E8754459C6D}" dt="2021-02-22T14:14:57.762" v="89" actId="478"/>
           <ac:picMkLst>
             <pc:docMk/>
             <pc:sldMk cId="2063437930" sldId="256"/>
@@ -440,7 +448,7 @@
           <a:p>
             <a:fld id="{460FF90E-6D7D-4763-B4A1-B56060A79806}" type="datetimeFigureOut">
               <a:rPr lang="en-US" smtClean="0"/>
-              <a:t>2/16/2021</a:t>
+              <a:t>2/22/2021</a:t>
             </a:fld>
             <a:endParaRPr lang="en-US"/>
           </a:p>
@@ -638,7 +646,7 @@
           <a:p>
             <a:fld id="{460FF90E-6D7D-4763-B4A1-B56060A79806}" type="datetimeFigureOut">
               <a:rPr lang="en-US" smtClean="0"/>
-              <a:t>2/16/2021</a:t>
+              <a:t>2/22/2021</a:t>
             </a:fld>
             <a:endParaRPr lang="en-US"/>
           </a:p>
@@ -846,7 +854,7 @@
           <a:p>
             <a:fld id="{460FF90E-6D7D-4763-B4A1-B56060A79806}" type="datetimeFigureOut">
               <a:rPr lang="en-US" smtClean="0"/>
-              <a:t>2/16/2021</a:t>
+              <a:t>2/22/2021</a:t>
             </a:fld>
             <a:endParaRPr lang="en-US"/>
           </a:p>
@@ -1044,7 +1052,7 @@
           <a:p>
             <a:fld id="{460FF90E-6D7D-4763-B4A1-B56060A79806}" type="datetimeFigureOut">
               <a:rPr lang="en-US" smtClean="0"/>
-              <a:t>2/16/2021</a:t>
+              <a:t>2/22/2021</a:t>
             </a:fld>
             <a:endParaRPr lang="en-US"/>
           </a:p>
@@ -1319,7 +1327,7 @@
           <a:p>
             <a:fld id="{460FF90E-6D7D-4763-B4A1-B56060A79806}" type="datetimeFigureOut">
               <a:rPr lang="en-US" smtClean="0"/>
-              <a:t>2/16/2021</a:t>
+              <a:t>2/22/2021</a:t>
             </a:fld>
             <a:endParaRPr lang="en-US"/>
           </a:p>
@@ -1584,7 +1592,7 @@
           <a:p>
             <a:fld id="{460FF90E-6D7D-4763-B4A1-B56060A79806}" type="datetimeFigureOut">
               <a:rPr lang="en-US" smtClean="0"/>
-              <a:t>2/16/2021</a:t>
+              <a:t>2/22/2021</a:t>
             </a:fld>
             <a:endParaRPr lang="en-US"/>
           </a:p>
@@ -1996,7 +2004,7 @@
           <a:p>
             <a:fld id="{460FF90E-6D7D-4763-B4A1-B56060A79806}" type="datetimeFigureOut">
               <a:rPr lang="en-US" smtClean="0"/>
-              <a:t>2/16/2021</a:t>
+              <a:t>2/22/2021</a:t>
             </a:fld>
             <a:endParaRPr lang="en-US"/>
           </a:p>
@@ -2137,7 +2145,7 @@
           <a:p>
             <a:fld id="{460FF90E-6D7D-4763-B4A1-B56060A79806}" type="datetimeFigureOut">
               <a:rPr lang="en-US" smtClean="0"/>
-              <a:t>2/16/2021</a:t>
+              <a:t>2/22/2021</a:t>
             </a:fld>
             <a:endParaRPr lang="en-US"/>
           </a:p>
@@ -2250,7 +2258,7 @@
           <a:p>
             <a:fld id="{460FF90E-6D7D-4763-B4A1-B56060A79806}" type="datetimeFigureOut">
               <a:rPr lang="en-US" smtClean="0"/>
-              <a:t>2/16/2021</a:t>
+              <a:t>2/22/2021</a:t>
             </a:fld>
             <a:endParaRPr lang="en-US"/>
           </a:p>
@@ -2561,7 +2569,7 @@
           <a:p>
             <a:fld id="{460FF90E-6D7D-4763-B4A1-B56060A79806}" type="datetimeFigureOut">
               <a:rPr lang="en-US" smtClean="0"/>
-              <a:t>2/16/2021</a:t>
+              <a:t>2/22/2021</a:t>
             </a:fld>
             <a:endParaRPr lang="en-US"/>
           </a:p>
@@ -2849,7 +2857,7 @@
           <a:p>
             <a:fld id="{460FF90E-6D7D-4763-B4A1-B56060A79806}" type="datetimeFigureOut">
               <a:rPr lang="en-US" smtClean="0"/>
-              <a:t>2/16/2021</a:t>
+              <a:t>2/22/2021</a:t>
             </a:fld>
             <a:endParaRPr lang="en-US"/>
           </a:p>
@@ -3090,7 +3098,7 @@
           <a:p>
             <a:fld id="{460FF90E-6D7D-4763-B4A1-B56060A79806}" type="datetimeFigureOut">
               <a:rPr lang="en-US" smtClean="0"/>
-              <a:t>2/16/2021</a:t>
+              <a:t>2/22/2021</a:t>
             </a:fld>
             <a:endParaRPr lang="en-US"/>
           </a:p>
@@ -3864,10 +3872,10 @@
       </p:pic>
       <p:pic>
         <p:nvPicPr>
-          <p:cNvPr id="8" name="Graphic 7">
-            <a:extLst>
-              <a:ext uri="{FF2B5EF4-FFF2-40B4-BE49-F238E27FC236}">
-                <a16:creationId xmlns:a16="http://schemas.microsoft.com/office/drawing/2014/main" id="{DEE6C00D-81CA-4AAA-8DEC-BE6B9BDEC728}"/>
+          <p:cNvPr id="12" name="Picture 11" descr="Chart&#10;&#10;Description automatically generated">
+            <a:extLst>
+              <a:ext uri="{FF2B5EF4-FFF2-40B4-BE49-F238E27FC236}">
+                <a16:creationId xmlns:a16="http://schemas.microsoft.com/office/drawing/2014/main" id="{592F2413-BC24-4913-A07F-FAA5BBAB9904}"/>
               </a:ext>
             </a:extLst>
           </p:cNvPr>
@@ -3877,21 +3885,15 @@
           <p:nvPr/>
         </p:nvPicPr>
         <p:blipFill>
-          <a:blip r:embed="rId6">
-            <a:extLst>
-              <a:ext uri="{96DAC541-7B7A-43D3-8B79-37D633B846F1}">
-                <asvg:svgBlip xmlns:asvg="http://schemas.microsoft.com/office/drawing/2016/SVG/main" r:embed="rId7"/>
-              </a:ext>
-            </a:extLst>
-          </a:blip>
+          <a:blip r:embed="rId6"/>
           <a:stretch>
             <a:fillRect/>
           </a:stretch>
         </p:blipFill>
         <p:spPr>
           <a:xfrm>
-            <a:off x="437425" y="2303889"/>
-            <a:ext cx="6442827" cy="2328671"/>
+            <a:off x="5904706" y="4781482"/>
+            <a:ext cx="6287294" cy="1866727"/>
           </a:xfrm>
           <a:prstGeom prst="rect">
             <a:avLst/>
@@ -3900,10 +3902,10 @@
       </p:pic>
       <p:pic>
         <p:nvPicPr>
-          <p:cNvPr id="12" name="Picture 11" descr="Chart&#10;&#10;Description automatically generated">
-            <a:extLst>
-              <a:ext uri="{FF2B5EF4-FFF2-40B4-BE49-F238E27FC236}">
-                <a16:creationId xmlns:a16="http://schemas.microsoft.com/office/drawing/2014/main" id="{592F2413-BC24-4913-A07F-FAA5BBAB9904}"/>
+          <p:cNvPr id="4" name="Picture 3" descr="Chart, box and whisker chart&#10;&#10;Description automatically generated">
+            <a:extLst>
+              <a:ext uri="{FF2B5EF4-FFF2-40B4-BE49-F238E27FC236}">
+                <a16:creationId xmlns:a16="http://schemas.microsoft.com/office/drawing/2014/main" id="{FD5CE793-5162-4A53-A1F1-162AFFA24F6E}"/>
               </a:ext>
             </a:extLst>
           </p:cNvPr>
@@ -3913,15 +3915,15 @@
           <p:nvPr/>
         </p:nvPicPr>
         <p:blipFill>
-          <a:blip r:embed="rId8"/>
+          <a:blip r:embed="rId7"/>
           <a:stretch>
             <a:fillRect/>
           </a:stretch>
         </p:blipFill>
         <p:spPr>
           <a:xfrm>
-            <a:off x="5904706" y="4781482"/>
-            <a:ext cx="6287294" cy="1866727"/>
+            <a:off x="476698" y="2299383"/>
+            <a:ext cx="5418893" cy="2482099"/>
           </a:xfrm>
           <a:prstGeom prst="rect">
             <a:avLst/>

</xml_diff>